<commit_message>
Updating user guide to match new added user interface elements.
</commit_message>
<xml_diff>
--- a/app/OGC-Preview User Guide.pptx
+++ b/app/OGC-Preview User Guide.pptx
@@ -7,11 +7,12 @@
   <p:sldIdLst>
     <p:sldId id="256" r:id="rId2"/>
     <p:sldId id="257" r:id="rId3"/>
-    <p:sldId id="258" r:id="rId4"/>
-    <p:sldId id="259" r:id="rId5"/>
-    <p:sldId id="260" r:id="rId6"/>
-    <p:sldId id="261" r:id="rId7"/>
-    <p:sldId id="262" r:id="rId8"/>
+    <p:sldId id="263" r:id="rId4"/>
+    <p:sldId id="258" r:id="rId5"/>
+    <p:sldId id="259" r:id="rId6"/>
+    <p:sldId id="260" r:id="rId7"/>
+    <p:sldId id="261" r:id="rId8"/>
+    <p:sldId id="262" r:id="rId9"/>
   </p:sldIdLst>
   <p:sldSz cx="12192000" cy="6858000"/>
   <p:notesSz cx="6858000" cy="9144000"/>
@@ -110,6 +111,11 @@
       </a:defRPr>
     </a:lvl9pPr>
   </p:defaultTextStyle>
+  <p:extLst>
+    <p:ext uri="{EFAFB233-063F-42B5-8137-9DF3F51BA10A}">
+      <p15:sldGuideLst xmlns:p15="http://schemas.microsoft.com/office/powerpoint/2012/main"/>
+    </p:ext>
+  </p:extLst>
 </p:presentation>
 </file>
 
@@ -244,7 +250,7 @@
           <a:p>
             <a:fld id="{39E96953-EAF2-4017-9353-1A3639ADEA64}" type="datetimeFigureOut">
               <a:rPr lang="en-US" smtClean="0"/>
-              <a:t>10/2/2015</a:t>
+              <a:t>12/4/2015</a:t>
             </a:fld>
             <a:endParaRPr lang="en-US"/>
           </a:p>
@@ -414,7 +420,7 @@
           <a:p>
             <a:fld id="{39E96953-EAF2-4017-9353-1A3639ADEA64}" type="datetimeFigureOut">
               <a:rPr lang="en-US" smtClean="0"/>
-              <a:t>10/2/2015</a:t>
+              <a:t>12/4/2015</a:t>
             </a:fld>
             <a:endParaRPr lang="en-US"/>
           </a:p>
@@ -594,7 +600,7 @@
           <a:p>
             <a:fld id="{39E96953-EAF2-4017-9353-1A3639ADEA64}" type="datetimeFigureOut">
               <a:rPr lang="en-US" smtClean="0"/>
-              <a:t>10/2/2015</a:t>
+              <a:t>12/4/2015</a:t>
             </a:fld>
             <a:endParaRPr lang="en-US"/>
           </a:p>
@@ -764,7 +770,7 @@
           <a:p>
             <a:fld id="{39E96953-EAF2-4017-9353-1A3639ADEA64}" type="datetimeFigureOut">
               <a:rPr lang="en-US" smtClean="0"/>
-              <a:t>10/2/2015</a:t>
+              <a:t>12/4/2015</a:t>
             </a:fld>
             <a:endParaRPr lang="en-US"/>
           </a:p>
@@ -1010,7 +1016,7 @@
           <a:p>
             <a:fld id="{39E96953-EAF2-4017-9353-1A3639ADEA64}" type="datetimeFigureOut">
               <a:rPr lang="en-US" smtClean="0"/>
-              <a:t>10/2/2015</a:t>
+              <a:t>12/4/2015</a:t>
             </a:fld>
             <a:endParaRPr lang="en-US"/>
           </a:p>
@@ -1242,7 +1248,7 @@
           <a:p>
             <a:fld id="{39E96953-EAF2-4017-9353-1A3639ADEA64}" type="datetimeFigureOut">
               <a:rPr lang="en-US" smtClean="0"/>
-              <a:t>10/2/2015</a:t>
+              <a:t>12/4/2015</a:t>
             </a:fld>
             <a:endParaRPr lang="en-US"/>
           </a:p>
@@ -1609,7 +1615,7 @@
           <a:p>
             <a:fld id="{39E96953-EAF2-4017-9353-1A3639ADEA64}" type="datetimeFigureOut">
               <a:rPr lang="en-US" smtClean="0"/>
-              <a:t>10/2/2015</a:t>
+              <a:t>12/4/2015</a:t>
             </a:fld>
             <a:endParaRPr lang="en-US"/>
           </a:p>
@@ -1727,7 +1733,7 @@
           <a:p>
             <a:fld id="{39E96953-EAF2-4017-9353-1A3639ADEA64}" type="datetimeFigureOut">
               <a:rPr lang="en-US" smtClean="0"/>
-              <a:t>10/2/2015</a:t>
+              <a:t>12/4/2015</a:t>
             </a:fld>
             <a:endParaRPr lang="en-US"/>
           </a:p>
@@ -1822,7 +1828,7 @@
           <a:p>
             <a:fld id="{39E96953-EAF2-4017-9353-1A3639ADEA64}" type="datetimeFigureOut">
               <a:rPr lang="en-US" smtClean="0"/>
-              <a:t>10/2/2015</a:t>
+              <a:t>12/4/2015</a:t>
             </a:fld>
             <a:endParaRPr lang="en-US"/>
           </a:p>
@@ -2099,7 +2105,7 @@
           <a:p>
             <a:fld id="{39E96953-EAF2-4017-9353-1A3639ADEA64}" type="datetimeFigureOut">
               <a:rPr lang="en-US" smtClean="0"/>
-              <a:t>10/2/2015</a:t>
+              <a:t>12/4/2015</a:t>
             </a:fld>
             <a:endParaRPr lang="en-US"/>
           </a:p>
@@ -2352,7 +2358,7 @@
           <a:p>
             <a:fld id="{39E96953-EAF2-4017-9353-1A3639ADEA64}" type="datetimeFigureOut">
               <a:rPr lang="en-US" smtClean="0"/>
-              <a:t>10/2/2015</a:t>
+              <a:t>12/4/2015</a:t>
             </a:fld>
             <a:endParaRPr lang="en-US"/>
           </a:p>
@@ -2565,7 +2571,7 @@
           <a:p>
             <a:fld id="{39E96953-EAF2-4017-9353-1A3639ADEA64}" type="datetimeFigureOut">
               <a:rPr lang="en-US" smtClean="0"/>
-              <a:t>10/2/2015</a:t>
+              <a:t>12/4/2015</a:t>
             </a:fld>
             <a:endParaRPr lang="en-US"/>
           </a:p>
@@ -3078,7 +3084,7 @@
       </p:sp>
       <p:pic>
         <p:nvPicPr>
-          <p:cNvPr id="4" name="Content Placeholder 3"/>
+          <p:cNvPr id="5" name="Content Placeholder 4"/>
           <p:cNvPicPr>
             <a:picLocks noGrp="1" noChangeAspect="1"/>
           </p:cNvPicPr>
@@ -3178,133 +3184,123 @@
         <p:spPr/>
         <p:txBody>
           <a:bodyPr>
-            <a:normAutofit fontScale="47500" lnSpcReduction="20000"/>
+            <a:normAutofit fontScale="77500" lnSpcReduction="20000"/>
           </a:bodyPr>
           <a:lstStyle/>
           <a:p>
             <a:r>
               <a:rPr lang="en-US" dirty="0" smtClean="0"/>
-              <a:t>Filters</a:t>
+              <a:t>Header Controls</a:t>
             </a:r>
           </a:p>
           <a:p>
             <a:pPr lvl="1"/>
             <a:r>
               <a:rPr lang="en-US" dirty="0" smtClean="0"/>
-              <a:t>Date/Time</a:t>
+              <a:t>Server </a:t>
+            </a:r>
+            <a:r>
+              <a:rPr lang="en-US" dirty="0"/>
+              <a:t>Controls</a:t>
             </a:r>
           </a:p>
           <a:p>
             <a:pPr lvl="2"/>
             <a:r>
-              <a:rPr lang="en-US" dirty="0" smtClean="0"/>
-              <a:t>A variety of filters will be developed for managing the amount of data displayed.  Currently, date and time filtering is possible via a duration or a range selector.</a:t>
-            </a:r>
-          </a:p>
-          <a:p>
-            <a:r>
-              <a:rPr lang="en-US" dirty="0" smtClean="0"/>
-              <a:t>Layers</a:t>
+              <a:rPr lang="en-US" dirty="0"/>
+              <a:t>Configured </a:t>
+            </a:r>
+            <a:r>
+              <a:rPr lang="en-US" dirty="0" smtClean="0"/>
+              <a:t>server names </a:t>
+            </a:r>
+            <a:r>
+              <a:rPr lang="en-US" dirty="0"/>
+              <a:t>will be displayed.  By default, all configured servers will be turned on and highlighted as to be shown as “active.”  Clicked the name of the server will turn it on and off.  Clicking the refresh button next to the server name will force a refresh of all the layer data associated with that server.</a:t>
             </a:r>
           </a:p>
           <a:p>
             <a:pPr lvl="1"/>
             <a:r>
-              <a:rPr lang="en-US" dirty="0" smtClean="0"/>
-              <a:t>A listing of available geospatial layer information will be displayed with a checkbox.  Checking the box turns the layer’s information display on and off.</a:t>
-            </a:r>
-          </a:p>
-          <a:p>
-            <a:r>
-              <a:rPr lang="en-US" dirty="0" smtClean="0"/>
-              <a:t>Server Controls</a:t>
-            </a:r>
+              <a:rPr lang="en-US" dirty="0"/>
+              <a:t>View </a:t>
+            </a:r>
+            <a:r>
+              <a:rPr lang="en-US" dirty="0" smtClean="0"/>
+              <a:t>Attributes</a:t>
+            </a:r>
+          </a:p>
+          <a:p>
+            <a:pPr lvl="2"/>
+            <a:r>
+              <a:rPr lang="en-US" dirty="0" smtClean="0"/>
+              <a:t>This pops up a results window to get further information on the selected layer’s attributes for exporting data for further analysis.</a:t>
+            </a:r>
+            <a:endParaRPr lang="en-US" dirty="0"/>
           </a:p>
           <a:p>
             <a:pPr lvl="1"/>
             <a:r>
               <a:rPr lang="en-US" dirty="0" smtClean="0"/>
-              <a:t>Configured </a:t>
-            </a:r>
-            <a:r>
-              <a:rPr lang="en-US" dirty="0" err="1" smtClean="0"/>
-              <a:t>Geoserver</a:t>
-            </a:r>
-            <a:r>
-              <a:rPr lang="en-US" dirty="0" smtClean="0"/>
-              <a:t> names will be displayed.  By default, all configured servers will be turned on and highlighted as to be shown as “active.”  Clicked the name of the server will turn it on and off.  Clicking the refresh button next to the server name will force a refresh of all the layer data associated with that server.</a:t>
-            </a:r>
-          </a:p>
-          <a:p>
-            <a:r>
-              <a:rPr lang="en-US" dirty="0" smtClean="0"/>
-              <a:t>View Attributes</a:t>
+              <a:t>User Guide</a:t>
+            </a:r>
+          </a:p>
+          <a:p>
+            <a:pPr lvl="2"/>
+            <a:r>
+              <a:rPr lang="en-US" dirty="0" smtClean="0"/>
+              <a:t>You’ve found it, or here’s another way to get to where you are now.</a:t>
             </a:r>
           </a:p>
           <a:p>
             <a:pPr lvl="1"/>
             <a:r>
               <a:rPr lang="en-US" dirty="0" smtClean="0"/>
-              <a:t>After selecting a region on the map via the square selection tool the right of this button, a popup will appear with all the attributes of selected layers.</a:t>
-            </a:r>
-          </a:p>
-          <a:p>
-            <a:r>
-              <a:rPr lang="en-US" dirty="0" smtClean="0"/>
-              <a:t>Attribute Selection</a:t>
+              <a:t>About</a:t>
+            </a:r>
+          </a:p>
+          <a:p>
+            <a:pPr lvl="2"/>
+            <a:r>
+              <a:rPr lang="en-US" dirty="0" smtClean="0"/>
+              <a:t>Find the contact details to give us some helpful feedback!</a:t>
             </a:r>
           </a:p>
           <a:p>
             <a:pPr lvl="1"/>
             <a:r>
-              <a:rPr lang="en-US" dirty="0" smtClean="0"/>
-              <a:t>Square-looking selection tool will allow a rectangular region to be drawn on the map.  This area will be “in focus” for the view attributes button.</a:t>
-            </a:r>
-          </a:p>
-          <a:p>
-            <a:r>
-              <a:rPr lang="en-US" dirty="0" smtClean="0"/>
-              <a:t>Attribute De-selection</a:t>
+              <a:rPr lang="en-US" dirty="0"/>
+              <a:t>Application State Link</a:t>
+            </a:r>
+          </a:p>
+          <a:p>
+            <a:pPr lvl="2"/>
+            <a:r>
+              <a:rPr lang="en-US" dirty="0"/>
+              <a:t>This button will generate a shareable link to your current </a:t>
+            </a:r>
+            <a:r>
+              <a:rPr lang="en-US" dirty="0" smtClean="0"/>
+              <a:t>application’s </a:t>
+            </a:r>
+            <a:r>
+              <a:rPr lang="en-US" dirty="0"/>
+              <a:t>state.  It will preserve selected layers and filters.</a:t>
             </a:r>
           </a:p>
           <a:p>
             <a:pPr lvl="1"/>
             <a:r>
-              <a:rPr lang="en-US" dirty="0" smtClean="0"/>
-              <a:t>This will deselect the region drawn on the map.</a:t>
-            </a:r>
-          </a:p>
-          <a:p>
-            <a:r>
-              <a:rPr lang="en-US" dirty="0" smtClean="0"/>
-              <a:t>Application State Link</a:t>
-            </a:r>
-          </a:p>
-          <a:p>
-            <a:pPr lvl="1"/>
-            <a:r>
-              <a:rPr lang="en-US" dirty="0" smtClean="0"/>
-              <a:t>This button will generate a shareable link to your current applications’ state.  It will preserve selected layers and filters.</a:t>
-            </a:r>
-          </a:p>
-          <a:p>
-            <a:r>
-              <a:rPr lang="en-US" dirty="0" smtClean="0"/>
+              <a:rPr lang="en-US" dirty="0"/>
               <a:t>KML Links</a:t>
             </a:r>
           </a:p>
           <a:p>
-            <a:pPr lvl="1"/>
-            <a:r>
-              <a:rPr lang="en-US" dirty="0" smtClean="0"/>
+            <a:pPr lvl="2"/>
+            <a:r>
+              <a:rPr lang="en-US" dirty="0"/>
               <a:t>This button will generate KML file for the layers selected.   If more than one server’s layers are selected, a link for each server will be generated for use outside the tool.</a:t>
             </a:r>
-          </a:p>
-          <a:p>
-            <a:endParaRPr lang="en-US" dirty="0" smtClean="0"/>
-          </a:p>
-          <a:p>
-            <a:endParaRPr lang="en-US" dirty="0" smtClean="0"/>
           </a:p>
           <a:p>
             <a:endParaRPr lang="en-US" dirty="0"/>
@@ -3314,7 +3310,7 @@
     </p:spTree>
     <p:extLst>
       <p:ext uri="{BB962C8B-B14F-4D97-AF65-F5344CB8AC3E}">
-        <p14:creationId xmlns:p14="http://schemas.microsoft.com/office/powerpoint/2010/main" val="1281390727"/>
+        <p14:creationId xmlns:p14="http://schemas.microsoft.com/office/powerpoint/2010/main" val="1379409937"/>
       </p:ext>
     </p:extLst>
   </p:cSld>
@@ -3365,42 +3361,201 @@
           <a:p>
             <a:r>
               <a:rPr lang="en-US" dirty="0" smtClean="0"/>
-              <a:t>Selected Layers</a:t>
+              <a:t>Interface Explained</a:t>
             </a:r>
             <a:endParaRPr lang="en-US" dirty="0"/>
           </a:p>
         </p:txBody>
       </p:sp>
-      <p:pic>
-        <p:nvPicPr>
-          <p:cNvPr id="5" name="Content Placeholder 4"/>
-          <p:cNvPicPr>
-            <a:picLocks noGrp="1" noChangeAspect="1"/>
-          </p:cNvPicPr>
+      <p:sp>
+        <p:nvSpPr>
+          <p:cNvPr id="3" name="Content Placeholder 2"/>
+          <p:cNvSpPr>
+            <a:spLocks noGrp="1"/>
+          </p:cNvSpPr>
           <p:nvPr>
             <p:ph idx="1"/>
           </p:nvPr>
-        </p:nvPicPr>
-        <p:blipFill>
-          <a:blip r:embed="rId2"/>
-          <a:stretch>
-            <a:fillRect/>
-          </a:stretch>
-        </p:blipFill>
-        <p:spPr>
-          <a:xfrm>
-            <a:off x="2079380" y="1825625"/>
-            <a:ext cx="8033239" cy="4351338"/>
-          </a:xfrm>
-          <a:prstGeom prst="rect">
-            <a:avLst/>
-          </a:prstGeom>
-        </p:spPr>
-      </p:pic>
+        </p:nvSpPr>
+        <p:spPr/>
+        <p:txBody>
+          <a:bodyPr>
+            <a:normAutofit fontScale="62500" lnSpcReduction="20000"/>
+          </a:bodyPr>
+          <a:lstStyle/>
+          <a:p>
+            <a:r>
+              <a:rPr lang="en-US" dirty="0" smtClean="0"/>
+              <a:t>Sidebar Controls</a:t>
+            </a:r>
+          </a:p>
+          <a:p>
+            <a:pPr lvl="1"/>
+            <a:r>
+              <a:rPr lang="en-US" dirty="0" smtClean="0"/>
+              <a:t>Filters</a:t>
+            </a:r>
+          </a:p>
+          <a:p>
+            <a:pPr lvl="2"/>
+            <a:r>
+              <a:rPr lang="en-US" dirty="0" smtClean="0"/>
+              <a:t>Location – select one of the following at a time:</a:t>
+            </a:r>
+          </a:p>
+          <a:p>
+            <a:pPr lvl="3"/>
+            <a:r>
+              <a:rPr lang="en-US" dirty="0" smtClean="0"/>
+              <a:t>Whole World</a:t>
+            </a:r>
+          </a:p>
+          <a:p>
+            <a:pPr lvl="4"/>
+            <a:r>
+              <a:rPr lang="en-US" dirty="0" smtClean="0"/>
+              <a:t>Default to querying based on the entire map of the world (returns all results of all enabled layers)</a:t>
+            </a:r>
+          </a:p>
+          <a:p>
+            <a:pPr lvl="3"/>
+            <a:r>
+              <a:rPr lang="en-US" dirty="0" smtClean="0"/>
+              <a:t>Constrain to map</a:t>
+            </a:r>
+          </a:p>
+          <a:p>
+            <a:pPr lvl="4"/>
+            <a:r>
+              <a:rPr lang="en-US" dirty="0" smtClean="0"/>
+              <a:t>Limit the results to the current map’s zoom state</a:t>
+            </a:r>
+          </a:p>
+          <a:p>
+            <a:pPr lvl="3"/>
+            <a:r>
+              <a:rPr lang="en-US" dirty="0" smtClean="0"/>
+              <a:t>Bounds</a:t>
+            </a:r>
+          </a:p>
+          <a:p>
+            <a:pPr lvl="4"/>
+            <a:r>
+              <a:rPr lang="en-US" dirty="0" smtClean="0"/>
+              <a:t>Input specific North, East, South, and West coordinates to draw a bounding rectangle for filtering.</a:t>
+            </a:r>
+          </a:p>
+          <a:p>
+            <a:pPr lvl="3"/>
+            <a:r>
+              <a:rPr lang="en-US" dirty="0" smtClean="0"/>
+              <a:t>Center Point</a:t>
+            </a:r>
+          </a:p>
+          <a:p>
+            <a:pPr lvl="4"/>
+            <a:r>
+              <a:rPr lang="en-US" dirty="0" smtClean="0"/>
+              <a:t>Select a center point in </a:t>
+            </a:r>
+            <a:r>
+              <a:rPr lang="en-US" dirty="0" err="1" smtClean="0"/>
+              <a:t>lat</a:t>
+            </a:r>
+            <a:r>
+              <a:rPr lang="en-US" dirty="0" smtClean="0"/>
+              <a:t>/long and a distance to make a bounding rectangle for filtering.</a:t>
+            </a:r>
+          </a:p>
+          <a:p>
+            <a:pPr lvl="3"/>
+            <a:r>
+              <a:rPr lang="en-US" dirty="0" smtClean="0"/>
+              <a:t>Country</a:t>
+            </a:r>
+          </a:p>
+          <a:p>
+            <a:pPr lvl="4"/>
+            <a:r>
+              <a:rPr lang="en-US" dirty="0" smtClean="0"/>
+              <a:t>Select one or multiple countries to filter on.</a:t>
+            </a:r>
+          </a:p>
+          <a:p>
+            <a:pPr lvl="3"/>
+            <a:r>
+              <a:rPr lang="en-US" dirty="0" smtClean="0"/>
+              <a:t>Shapefile</a:t>
+            </a:r>
+          </a:p>
+          <a:p>
+            <a:pPr lvl="4"/>
+            <a:r>
+              <a:rPr lang="en-US" dirty="0" smtClean="0"/>
+              <a:t>Upload a region shapefile to filter on.</a:t>
+            </a:r>
+            <a:endParaRPr lang="en-US" dirty="0" smtClean="0"/>
+          </a:p>
+          <a:p>
+            <a:pPr lvl="3"/>
+            <a:r>
+              <a:rPr lang="en-US" dirty="0" smtClean="0"/>
+              <a:t>Manual Draw</a:t>
+            </a:r>
+            <a:endParaRPr lang="en-US" dirty="0"/>
+          </a:p>
+          <a:p>
+            <a:pPr lvl="4"/>
+            <a:r>
+              <a:rPr lang="en-US" dirty="0" smtClean="0"/>
+              <a:t>Drawing tools are provided hovering on the map – you can manual draw polygons and circles.</a:t>
+            </a:r>
+            <a:endParaRPr lang="en-US" dirty="0" smtClean="0"/>
+          </a:p>
+          <a:p>
+            <a:pPr lvl="2"/>
+            <a:r>
+              <a:rPr lang="en-US" dirty="0" smtClean="0"/>
+              <a:t>Date/Time</a:t>
+            </a:r>
+          </a:p>
+          <a:p>
+            <a:pPr lvl="3"/>
+            <a:r>
+              <a:rPr lang="en-US" dirty="0" smtClean="0"/>
+              <a:t>A variety of filters will be developed for managing the amount of data displayed.  Currently, date and time filtering is possible via a duration or a range selector.</a:t>
+            </a:r>
+          </a:p>
+          <a:p>
+            <a:pPr lvl="1"/>
+            <a:r>
+              <a:rPr lang="en-US" dirty="0" smtClean="0"/>
+              <a:t>Layer Selection</a:t>
+            </a:r>
+            <a:endParaRPr lang="en-US" dirty="0" smtClean="0"/>
+          </a:p>
+          <a:p>
+            <a:pPr lvl="2"/>
+            <a:r>
+              <a:rPr lang="en-US" dirty="0" smtClean="0"/>
+              <a:t>A listing of available geospatial layer information will be displayed with a checkbox.  Checking the box turns the layer’s information display on and off.</a:t>
+            </a:r>
+          </a:p>
+          <a:p>
+            <a:endParaRPr lang="en-US" dirty="0" smtClean="0"/>
+          </a:p>
+          <a:p>
+            <a:endParaRPr lang="en-US" dirty="0" smtClean="0"/>
+          </a:p>
+          <a:p>
+            <a:endParaRPr lang="en-US" dirty="0"/>
+          </a:p>
+        </p:txBody>
+      </p:sp>
     </p:spTree>
     <p:extLst>
       <p:ext uri="{BB962C8B-B14F-4D97-AF65-F5344CB8AC3E}">
-        <p14:creationId xmlns:p14="http://schemas.microsoft.com/office/powerpoint/2010/main" val="1812957788"/>
+        <p14:creationId xmlns:p14="http://schemas.microsoft.com/office/powerpoint/2010/main" val="1281390727"/>
       </p:ext>
     </p:extLst>
   </p:cSld>
@@ -3457,6 +3612,95 @@
           </a:p>
         </p:txBody>
       </p:sp>
+      <p:pic>
+        <p:nvPicPr>
+          <p:cNvPr id="4" name="Content Placeholder 3"/>
+          <p:cNvPicPr>
+            <a:picLocks noGrp="1" noChangeAspect="1"/>
+          </p:cNvPicPr>
+          <p:nvPr>
+            <p:ph idx="1"/>
+          </p:nvPr>
+        </p:nvPicPr>
+        <p:blipFill>
+          <a:blip r:embed="rId2">
+            <a:extLst>
+              <a:ext uri="{28A0092B-C50C-407E-A947-70E740481C1C}">
+                <a14:useLocalDpi xmlns:a14="http://schemas.microsoft.com/office/drawing/2010/main" val="0"/>
+              </a:ext>
+            </a:extLst>
+          </a:blip>
+          <a:stretch>
+            <a:fillRect/>
+          </a:stretch>
+        </p:blipFill>
+        <p:spPr>
+          <a:xfrm>
+            <a:off x="2079380" y="1825625"/>
+            <a:ext cx="8033239" cy="4351338"/>
+          </a:xfrm>
+        </p:spPr>
+      </p:pic>
+    </p:spTree>
+    <p:extLst>
+      <p:ext uri="{BB962C8B-B14F-4D97-AF65-F5344CB8AC3E}">
+        <p14:creationId xmlns:p14="http://schemas.microsoft.com/office/powerpoint/2010/main" val="1812957788"/>
+      </p:ext>
+    </p:extLst>
+  </p:cSld>
+  <p:clrMapOvr>
+    <a:masterClrMapping/>
+  </p:clrMapOvr>
+  <p:timing>
+    <p:tnLst>
+      <p:par>
+        <p:cTn id="1" dur="indefinite" restart="never" nodeType="tmRoot"/>
+      </p:par>
+    </p:tnLst>
+  </p:timing>
+</p:sld>
+</file>
+
+<file path=ppt/slides/slide6.xml><?xml version="1.0" encoding="utf-8"?>
+<p:sld xmlns:a="http://schemas.openxmlformats.org/drawingml/2006/main" xmlns:r="http://schemas.openxmlformats.org/officeDocument/2006/relationships" xmlns:p="http://schemas.openxmlformats.org/presentationml/2006/main">
+  <p:cSld>
+    <p:spTree>
+      <p:nvGrpSpPr>
+        <p:cNvPr id="1" name=""/>
+        <p:cNvGrpSpPr/>
+        <p:nvPr/>
+      </p:nvGrpSpPr>
+      <p:grpSpPr>
+        <a:xfrm>
+          <a:off x="0" y="0"/>
+          <a:ext cx="0" cy="0"/>
+          <a:chOff x="0" y="0"/>
+          <a:chExt cx="0" cy="0"/>
+        </a:xfrm>
+      </p:grpSpPr>
+      <p:sp>
+        <p:nvSpPr>
+          <p:cNvPr id="2" name="Title 1"/>
+          <p:cNvSpPr>
+            <a:spLocks noGrp="1"/>
+          </p:cNvSpPr>
+          <p:nvPr>
+            <p:ph type="title"/>
+          </p:nvPr>
+        </p:nvSpPr>
+        <p:spPr/>
+        <p:txBody>
+          <a:bodyPr/>
+          <a:lstStyle/>
+          <a:p>
+            <a:r>
+              <a:rPr lang="en-US" dirty="0" smtClean="0"/>
+              <a:t>Selected Layers</a:t>
+            </a:r>
+            <a:endParaRPr lang="en-US" dirty="0"/>
+          </a:p>
+        </p:txBody>
+      </p:sp>
       <p:sp>
         <p:nvSpPr>
           <p:cNvPr id="3" name="Content Placeholder 2"/>
@@ -3486,27 +3730,29 @@
           <a:p>
             <a:r>
               <a:rPr lang="en-US" dirty="0" smtClean="0"/>
-              <a:t>A bounding box is created via the attribute selection tool.</a:t>
-            </a:r>
-          </a:p>
-          <a:p>
-            <a:r>
-              <a:rPr lang="en-US" dirty="0" smtClean="0"/>
-              <a:t>In the previous screen, you can also see that I only have the “dev” </a:t>
-            </a:r>
-            <a:r>
-              <a:rPr lang="en-US" dirty="0" err="1" smtClean="0"/>
-              <a:t>Geoserver</a:t>
-            </a:r>
-            <a:r>
-              <a:rPr lang="en-US" dirty="0" smtClean="0"/>
-              <a:t> active, “prod” is turned off.</a:t>
-            </a:r>
-          </a:p>
-          <a:p>
-            <a:r>
-              <a:rPr lang="en-US" dirty="0" smtClean="0"/>
-              <a:t>In the previous screen, you can also see that the URL is updated to preserve the current filter and layer display</a:t>
+              <a:t>A bounding </a:t>
+            </a:r>
+            <a:r>
+              <a:rPr lang="en-US" dirty="0" smtClean="0"/>
+              <a:t>region </a:t>
+            </a:r>
+            <a:r>
+              <a:rPr lang="en-US" dirty="0" smtClean="0"/>
+              <a:t>is created via the attribute selection tool.</a:t>
+            </a:r>
+          </a:p>
+          <a:p>
+            <a:r>
+              <a:rPr lang="en-US" dirty="0" smtClean="0"/>
+              <a:t>In </a:t>
+            </a:r>
+            <a:r>
+              <a:rPr lang="en-US" dirty="0" smtClean="0"/>
+              <a:t>the previous screen, you can also see that the URL is updated to preserve the current filter and layer </a:t>
+            </a:r>
+            <a:r>
+              <a:rPr lang="en-US" dirty="0" smtClean="0"/>
+              <a:t>display.  You can use this feature to share your state or save the URL to come back later.</a:t>
             </a:r>
             <a:endParaRPr lang="en-US" dirty="0"/>
           </a:p>
@@ -3532,7 +3778,7 @@
 </p:sld>
 </file>
 
-<file path=ppt/slides/slide6.xml><?xml version="1.0" encoding="utf-8"?>
+<file path=ppt/slides/slide7.xml><?xml version="1.0" encoding="utf-8"?>
 <p:sld xmlns:a="http://schemas.openxmlformats.org/drawingml/2006/main" xmlns:r="http://schemas.openxmlformats.org/officeDocument/2006/relationships" xmlns:p="http://schemas.openxmlformats.org/presentationml/2006/main">
   <p:cSld>
     <p:spTree>
@@ -3618,7 +3864,7 @@
 </p:sld>
 </file>
 
-<file path=ppt/slides/slide7.xml><?xml version="1.0" encoding="utf-8"?>
+<file path=ppt/slides/slide8.xml><?xml version="1.0" encoding="utf-8"?>
 <p:sld xmlns:a="http://schemas.openxmlformats.org/drawingml/2006/main" xmlns:r="http://schemas.openxmlformats.org/officeDocument/2006/relationships" xmlns:p="http://schemas.openxmlformats.org/presentationml/2006/main">
   <p:cSld>
     <p:spTree>

</xml_diff>